<commit_message>
add incexc-60-04-42.pptx incexcbinom.pptx incexc2set.pptx
</commit_message>
<xml_diff>
--- a/spring13/slides13/incexcII.pptx
+++ b/spring13/slides13/incexcII.pptx
@@ -3126,8 +3126,8 @@
         </p:nvSpPr>
         <p:spPr bwMode="auto">
           <a:xfrm>
-            <a:off x="323850" y="1752600"/>
-            <a:ext cx="8515350" cy="3327400"/>
+            <a:off x="304800" y="1600200"/>
+            <a:ext cx="8591550" cy="3733800"/>
           </a:xfrm>
           <a:prstGeom prst="rect">
             <a:avLst/>
@@ -3152,8 +3152,35 @@
                 </a:solidFill>
                 <a:latin typeface="Comic Sans MS" pitchFamily="66" charset="0"/>
               </a:rPr>
-              <a:t>Inclusion-Exclusion, II</a:t>
-            </a:r>
+              <a:t>Inclusion-</a:t>
+            </a:r>
+            <a:r>
+              <a:rPr lang="en-US" sz="8000" b="1" dirty="0" smtClean="0">
+                <a:solidFill>
+                  <a:schemeClr val="tx2"/>
+                </a:solidFill>
+                <a:latin typeface="Comic Sans MS" pitchFamily="66" charset="0"/>
+              </a:rPr>
+              <a:t>Exclusion</a:t>
+            </a:r>
+          </a:p>
+          <a:p>
+            <a:pPr algn="ctr"/>
+            <a:r>
+              <a:rPr lang="en-US" sz="8000" dirty="0" smtClean="0">
+                <a:solidFill>
+                  <a:schemeClr val="tx2"/>
+                </a:solidFill>
+                <a:latin typeface="Comic Sans MS" pitchFamily="66" charset="0"/>
+              </a:rPr>
+              <a:t>Binomial Proof</a:t>
+            </a:r>
+            <a:endParaRPr lang="en-US" sz="8000" dirty="0" smtClean="0">
+              <a:solidFill>
+                <a:schemeClr val="tx2"/>
+              </a:solidFill>
+              <a:latin typeface="Comic Sans MS" pitchFamily="66" charset="0"/>
+            </a:endParaRPr>
           </a:p>
         </p:txBody>
       </p:sp>
@@ -3287,7 +3314,7 @@
           <a:graphicData uri="http://schemas.openxmlformats.org/presentationml/2006/ole">
             <mc:AlternateContent xmlns:mc="http://schemas.openxmlformats.org/markup-compatibility/2006">
               <mc:Choice xmlns:v="urn:schemas-microsoft-com:vml" Requires="v">
-                <p:oleObj spid="_x0000_s210995" name="Equation" r:id="rId4" imgW="2057400" imgH="533400" progId="Equation.DSMT4">
+                <p:oleObj spid="_x0000_s211002" name="Equation" r:id="rId4" imgW="2057400" imgH="533400" progId="Equation.DSMT4">
                   <p:embed/>
                 </p:oleObj>
               </mc:Choice>
@@ -3344,7 +3371,7 @@
           <a:graphicData uri="http://schemas.openxmlformats.org/presentationml/2006/ole">
             <mc:AlternateContent xmlns:mc="http://schemas.openxmlformats.org/markup-compatibility/2006">
               <mc:Choice xmlns:v="urn:schemas-microsoft-com:vml" Requires="v">
-                <p:oleObj spid="_x0000_s210996" name="Equation" r:id="rId6" imgW="1397000" imgH="241300" progId="Equation.DSMT4">
+                <p:oleObj spid="_x0000_s211003" name="Equation" r:id="rId6" imgW="1397000" imgH="241300" progId="Equation.DSMT4">
                   <p:embed/>
                 </p:oleObj>
               </mc:Choice>
@@ -3460,7 +3487,7 @@
           <a:graphicData uri="http://schemas.openxmlformats.org/presentationml/2006/ole">
             <mc:AlternateContent xmlns:mc="http://schemas.openxmlformats.org/markup-compatibility/2006">
               <mc:Choice xmlns:v="urn:schemas-microsoft-com:vml" Requires="v">
-                <p:oleObj spid="_x0000_s210997" name="Equation" r:id="rId8" imgW="1549400" imgH="266700" progId="Equation.DSMT4">
+                <p:oleObj spid="_x0000_s211004" name="Equation" r:id="rId8" imgW="1549400" imgH="266700" progId="Equation.DSMT4">
                   <p:embed/>
                 </p:oleObj>
               </mc:Choice>
@@ -3793,7 +3820,7 @@
           <a:graphicData uri="http://schemas.openxmlformats.org/presentationml/2006/ole">
             <mc:AlternateContent xmlns:mc="http://schemas.openxmlformats.org/markup-compatibility/2006">
               <mc:Choice xmlns:v="urn:schemas-microsoft-com:vml" Requires="v">
-                <p:oleObj spid="_x0000_s5197" name="Equation" r:id="rId4" imgW="1346200" imgH="266700" progId="Equation.DSMT4">
+                <p:oleObj spid="_x0000_s5202" name="Equation" r:id="rId4" imgW="1346200" imgH="266700" progId="Equation.DSMT4">
                   <p:embed/>
                 </p:oleObj>
               </mc:Choice>
@@ -3863,7 +3890,7 @@
           <a:graphicData uri="http://schemas.openxmlformats.org/presentationml/2006/ole">
             <mc:AlternateContent xmlns:mc="http://schemas.openxmlformats.org/markup-compatibility/2006">
               <mc:Choice xmlns:v="urn:schemas-microsoft-com:vml" Requires="v">
-                <p:oleObj spid="_x0000_s5198" name="Equation" r:id="rId6" imgW="1447800" imgH="495300" progId="Equation.DSMT4">
+                <p:oleObj spid="_x0000_s5203" name="Equation" r:id="rId6" imgW="1447800" imgH="495300" progId="Equation.DSMT4">
                   <p:embed/>
                 </p:oleObj>
               </mc:Choice>
@@ -4002,7 +4029,7 @@
     <a:masterClrMapping/>
   </p:clrMapOvr>
   <p:transition xmlns:p14="http://schemas.microsoft.com/office/powerpoint/2010/main" spd="slow" advClick="0">
-    <p:fade/>
+    <p:fade thruBlk="1"/>
   </p:transition>
   <p:timing>
     <p:tnLst>
@@ -4186,25 +4213,25 @@
           <p:nvPr>
             <p:extLst>
               <p:ext uri="{D42A27DB-BD31-4B8C-83A1-F6EECF244321}">
-                <p14:modId xmlns:p14="http://schemas.microsoft.com/office/powerpoint/2010/main" val="3169416219"/>
+                <p14:modId xmlns:p14="http://schemas.microsoft.com/office/powerpoint/2010/main" val="1916367811"/>
               </p:ext>
             </p:extLst>
           </p:nvPr>
         </p:nvGraphicFramePr>
         <p:xfrm>
-          <a:off x="111125" y="1219200"/>
-          <a:ext cx="8880475" cy="2193925"/>
+          <a:off x="163513" y="1219200"/>
+          <a:ext cx="8775700" cy="2193925"/>
         </p:xfrm>
         <a:graphic>
           <a:graphicData uri="http://schemas.openxmlformats.org/presentationml/2006/ole">
             <mc:AlternateContent xmlns:mc="http://schemas.openxmlformats.org/markup-compatibility/2006">
               <mc:Choice xmlns:v="urn:schemas-microsoft-com:vml" Requires="v">
-                <p:oleObj spid="_x0000_s202793" name="Equation" r:id="rId4" imgW="2159000" imgH="533400" progId="Equation.3">
+                <p:oleObj spid="_x0000_s202798" name="Equation" r:id="rId4" imgW="2133600" imgH="533400" progId="Equation.DSMT4">
                   <p:embed/>
                 </p:oleObj>
               </mc:Choice>
               <mc:Fallback>
-                <p:oleObj name="Equation" r:id="rId4" imgW="2159000" imgH="533400" progId="Equation.3">
+                <p:oleObj name="Equation" r:id="rId4" imgW="2133600" imgH="533400" progId="Equation.DSMT4">
                   <p:embed/>
                   <p:pic>
                     <p:nvPicPr>
@@ -4220,8 +4247,8 @@
                     </p:blipFill>
                     <p:spPr>
                       <a:xfrm>
-                        <a:off x="111125" y="1219200"/>
-                        <a:ext cx="8880475" cy="2193925"/>
+                        <a:off x="163513" y="1219200"/>
+                        <a:ext cx="8775700" cy="2193925"/>
                       </a:xfrm>
                       <a:prstGeom prst="rect">
                         <a:avLst/>
@@ -4243,25 +4270,25 @@
           <p:nvPr>
             <p:extLst>
               <p:ext uri="{D42A27DB-BD31-4B8C-83A1-F6EECF244321}">
-                <p14:modId xmlns:p14="http://schemas.microsoft.com/office/powerpoint/2010/main" val="824080785"/>
+                <p14:modId xmlns:p14="http://schemas.microsoft.com/office/powerpoint/2010/main" val="2778360678"/>
               </p:ext>
             </p:extLst>
           </p:nvPr>
         </p:nvGraphicFramePr>
         <p:xfrm>
-          <a:off x="152400" y="3498714"/>
-          <a:ext cx="8763000" cy="1831075"/>
+          <a:off x="130175" y="3498850"/>
+          <a:ext cx="8807450" cy="1830388"/>
         </p:xfrm>
         <a:graphic>
           <a:graphicData uri="http://schemas.openxmlformats.org/presentationml/2006/ole">
             <mc:AlternateContent xmlns:mc="http://schemas.openxmlformats.org/markup-compatibility/2006">
               <mc:Choice xmlns:v="urn:schemas-microsoft-com:vml" Requires="v">
-                <p:oleObj spid="_x0000_s202794" name="Equation" r:id="rId6" imgW="2552700" imgH="533400" progId="Equation.DSMT4">
+                <p:oleObj spid="_x0000_s202799" name="Equation" r:id="rId6" imgW="2565400" imgH="533400" progId="Equation.DSMT4">
                   <p:embed/>
                 </p:oleObj>
               </mc:Choice>
               <mc:Fallback>
-                <p:oleObj name="Equation" r:id="rId6" imgW="2552700" imgH="533400" progId="Equation.DSMT4">
+                <p:oleObj name="Equation" r:id="rId6" imgW="2565400" imgH="533400" progId="Equation.DSMT4">
                   <p:embed/>
                   <p:pic>
                     <p:nvPicPr>
@@ -4277,8 +4304,8 @@
                     </p:blipFill>
                     <p:spPr>
                       <a:xfrm>
-                        <a:off x="152400" y="3498714"/>
-                        <a:ext cx="8763000" cy="1831075"/>
+                        <a:off x="130175" y="3498850"/>
+                        <a:ext cx="8807450" cy="1830388"/>
                       </a:xfrm>
                       <a:prstGeom prst="rect">
                         <a:avLst/>
@@ -4307,7 +4334,136 @@
   <p:timing>
     <p:tnLst>
       <p:par>
-        <p:cTn xmlns:p14="http://schemas.microsoft.com/office/powerpoint/2010/main" id="1" dur="indefinite" restart="never" nodeType="tmRoot"/>
+        <p:cTn xmlns:p14="http://schemas.microsoft.com/office/powerpoint/2010/main" id="1" dur="indefinite" restart="never" nodeType="tmRoot">
+          <p:childTnLst>
+            <p:seq concurrent="1" nextAc="seek">
+              <p:cTn id="2" dur="indefinite" nodeType="mainSeq">
+                <p:childTnLst>
+                  <p:par>
+                    <p:cTn id="3" fill="hold">
+                      <p:stCondLst>
+                        <p:cond delay="indefinite"/>
+                      </p:stCondLst>
+                      <p:childTnLst>
+                        <p:par>
+                          <p:cTn id="4" fill="hold">
+                            <p:stCondLst>
+                              <p:cond delay="0"/>
+                            </p:stCondLst>
+                            <p:childTnLst>
+                              <p:par>
+                                <p:cTn id="5" presetID="22" presetClass="entr" presetSubtype="8" fill="hold" nodeType="clickEffect">
+                                  <p:stCondLst>
+                                    <p:cond delay="0"/>
+                                  </p:stCondLst>
+                                  <p:childTnLst>
+                                    <p:set>
+                                      <p:cBhvr>
+                                        <p:cTn id="6" dur="1" fill="hold">
+                                          <p:stCondLst>
+                                            <p:cond delay="0"/>
+                                          </p:stCondLst>
+                                        </p:cTn>
+                                        <p:tgtEl>
+                                          <p:spTgt spid="3"/>
+                                        </p:tgtEl>
+                                        <p:attrNameLst>
+                                          <p:attrName>style.visibility</p:attrName>
+                                        </p:attrNameLst>
+                                      </p:cBhvr>
+                                      <p:to>
+                                        <p:strVal val="visible"/>
+                                      </p:to>
+                                    </p:set>
+                                    <p:animEffect transition="in" filter="wipe(left)">
+                                      <p:cBhvr>
+                                        <p:cTn id="7" dur="2000"/>
+                                        <p:tgtEl>
+                                          <p:spTgt spid="3"/>
+                                        </p:tgtEl>
+                                      </p:cBhvr>
+                                    </p:animEffect>
+                                  </p:childTnLst>
+                                </p:cTn>
+                              </p:par>
+                            </p:childTnLst>
+                          </p:cTn>
+                        </p:par>
+                      </p:childTnLst>
+                    </p:cTn>
+                  </p:par>
+                  <p:par>
+                    <p:cTn id="8" fill="hold">
+                      <p:stCondLst>
+                        <p:cond delay="indefinite"/>
+                      </p:stCondLst>
+                      <p:childTnLst>
+                        <p:par>
+                          <p:cTn id="9" fill="hold">
+                            <p:stCondLst>
+                              <p:cond delay="0"/>
+                            </p:stCondLst>
+                            <p:childTnLst>
+                              <p:par>
+                                <p:cTn id="10" presetID="22" presetClass="entr" presetSubtype="8" fill="hold" nodeType="clickEffect">
+                                  <p:stCondLst>
+                                    <p:cond delay="0"/>
+                                  </p:stCondLst>
+                                  <p:childTnLst>
+                                    <p:set>
+                                      <p:cBhvr>
+                                        <p:cTn id="11" dur="1" fill="hold">
+                                          <p:stCondLst>
+                                            <p:cond delay="0"/>
+                                          </p:stCondLst>
+                                        </p:cTn>
+                                        <p:tgtEl>
+                                          <p:spTgt spid="2"/>
+                                        </p:tgtEl>
+                                        <p:attrNameLst>
+                                          <p:attrName>style.visibility</p:attrName>
+                                        </p:attrNameLst>
+                                      </p:cBhvr>
+                                      <p:to>
+                                        <p:strVal val="visible"/>
+                                      </p:to>
+                                    </p:set>
+                                    <p:animEffect transition="in" filter="wipe(left)">
+                                      <p:cBhvr>
+                                        <p:cTn id="12" dur="2000"/>
+                                        <p:tgtEl>
+                                          <p:spTgt spid="2"/>
+                                        </p:tgtEl>
+                                      </p:cBhvr>
+                                    </p:animEffect>
+                                  </p:childTnLst>
+                                </p:cTn>
+                              </p:par>
+                            </p:childTnLst>
+                          </p:cTn>
+                        </p:par>
+                      </p:childTnLst>
+                    </p:cTn>
+                  </p:par>
+                </p:childTnLst>
+              </p:cTn>
+              <p:prevCondLst>
+                <p:cond evt="onPrev" delay="0">
+                  <p:tgtEl>
+                    <p:sldTgt/>
+                  </p:tgtEl>
+                </p:cond>
+              </p:prevCondLst>
+              <p:nextCondLst>
+                <p:cond evt="onNext" delay="0">
+                  <p:tgtEl>
+                    <p:sldTgt/>
+                  </p:tgtEl>
+                </p:cond>
+              </p:nextCondLst>
+            </p:seq>
+          </p:childTnLst>
+        </p:cTn>
       </p:par>
     </p:tnLst>
   </p:timing>
@@ -4410,7 +4566,7 @@
           <p:nvPr>
             <p:extLst>
               <p:ext uri="{D42A27DB-BD31-4B8C-83A1-F6EECF244321}">
-                <p14:modId xmlns:p14="http://schemas.microsoft.com/office/powerpoint/2010/main" val="3324282605"/>
+                <p14:modId xmlns:p14="http://schemas.microsoft.com/office/powerpoint/2010/main" val="3158908450"/>
               </p:ext>
             </p:extLst>
           </p:nvPr>
@@ -4423,7 +4579,7 @@
           <a:graphicData uri="http://schemas.openxmlformats.org/presentationml/2006/ole">
             <mc:AlternateContent xmlns:mc="http://schemas.openxmlformats.org/markup-compatibility/2006">
               <mc:Choice xmlns:v="urn:schemas-microsoft-com:vml" Requires="v">
-                <p:oleObj spid="_x0000_s203823" name="Equation" r:id="rId4" imgW="1092200" imgH="533400" progId="Equation.DSMT4">
+                <p:oleObj spid="_x0000_s203828" name="Equation" r:id="rId4" imgW="1092200" imgH="533400" progId="Equation.DSMT4">
                   <p:embed/>
                 </p:oleObj>
               </mc:Choice>
@@ -4467,25 +4623,25 @@
           <p:nvPr>
             <p:extLst>
               <p:ext uri="{D42A27DB-BD31-4B8C-83A1-F6EECF244321}">
-                <p14:modId xmlns:p14="http://schemas.microsoft.com/office/powerpoint/2010/main" val="951428093"/>
+                <p14:modId xmlns:p14="http://schemas.microsoft.com/office/powerpoint/2010/main" val="1717101166"/>
               </p:ext>
             </p:extLst>
           </p:nvPr>
         </p:nvGraphicFramePr>
         <p:xfrm>
-          <a:off x="2286000" y="3733800"/>
-          <a:ext cx="5588000" cy="2523867"/>
+          <a:off x="2255838" y="3733800"/>
+          <a:ext cx="5648325" cy="2524125"/>
         </p:xfrm>
         <a:graphic>
           <a:graphicData uri="http://schemas.openxmlformats.org/presentationml/2006/ole">
             <mc:AlternateContent xmlns:mc="http://schemas.openxmlformats.org/markup-compatibility/2006">
               <mc:Choice xmlns:v="urn:schemas-microsoft-com:vml" Requires="v">
-                <p:oleObj spid="_x0000_s203824" name="Equation" r:id="rId6" imgW="1181100" imgH="533400" progId="Equation.DSMT4">
+                <p:oleObj spid="_x0000_s203829" name="Equation" r:id="rId6" imgW="1193800" imgH="533400" progId="Equation.DSMT4">
                   <p:embed/>
                 </p:oleObj>
               </mc:Choice>
               <mc:Fallback>
-                <p:oleObj name="Equation" r:id="rId6" imgW="1181100" imgH="533400" progId="Equation.DSMT4">
+                <p:oleObj name="Equation" r:id="rId6" imgW="1193800" imgH="533400" progId="Equation.DSMT4">
                   <p:embed/>
                   <p:pic>
                     <p:nvPicPr>
@@ -4501,8 +4657,8 @@
                     </p:blipFill>
                     <p:spPr>
                       <a:xfrm>
-                        <a:off x="2286000" y="3733800"/>
-                        <a:ext cx="5588000" cy="2523867"/>
+                        <a:off x="2255838" y="3733800"/>
+                        <a:ext cx="5648325" cy="2524125"/>
                       </a:xfrm>
                       <a:prstGeom prst="rect">
                         <a:avLst/>
@@ -4540,9 +4696,6 @@
                     <p:cTn id="3" fill="hold">
                       <p:stCondLst>
                         <p:cond delay="indefinite"/>
-                        <p:cond evt="onBegin" delay="0">
-                          <p:tn val="2"/>
-                        </p:cond>
                       </p:stCondLst>
                       <p:childTnLst>
                         <p:par>
@@ -4552,7 +4705,7 @@
                             </p:stCondLst>
                             <p:childTnLst>
                               <p:par>
-                                <p:cTn id="5" presetID="22" presetClass="entr" presetSubtype="8" fill="hold" nodeType="withEffect">
+                                <p:cTn id="5" presetID="22" presetClass="entr" presetSubtype="8" fill="hold" nodeType="clickEffect">
                                   <p:stCondLst>
                                     <p:cond delay="0"/>
                                   </p:stCondLst>
@@ -4560,59 +4713,6 @@
                                     <p:set>
                                       <p:cBhvr>
                                         <p:cTn id="6" dur="1" fill="hold">
-                                          <p:stCondLst>
-                                            <p:cond delay="0"/>
-                                          </p:stCondLst>
-                                        </p:cTn>
-                                        <p:tgtEl>
-                                          <p:spTgt spid="3"/>
-                                        </p:tgtEl>
-                                        <p:attrNameLst>
-                                          <p:attrName>style.visibility</p:attrName>
-                                        </p:attrNameLst>
-                                      </p:cBhvr>
-                                      <p:to>
-                                        <p:strVal val="visible"/>
-                                      </p:to>
-                                    </p:set>
-                                    <p:animEffect transition="in" filter="wipe(left)">
-                                      <p:cBhvr>
-                                        <p:cTn id="7" dur="1000"/>
-                                        <p:tgtEl>
-                                          <p:spTgt spid="3"/>
-                                        </p:tgtEl>
-                                      </p:cBhvr>
-                                    </p:animEffect>
-                                  </p:childTnLst>
-                                </p:cTn>
-                              </p:par>
-                            </p:childTnLst>
-                          </p:cTn>
-                        </p:par>
-                      </p:childTnLst>
-                    </p:cTn>
-                  </p:par>
-                  <p:par>
-                    <p:cTn id="8" fill="hold">
-                      <p:stCondLst>
-                        <p:cond delay="indefinite"/>
-                      </p:stCondLst>
-                      <p:childTnLst>
-                        <p:par>
-                          <p:cTn id="9" fill="hold">
-                            <p:stCondLst>
-                              <p:cond delay="0"/>
-                            </p:stCondLst>
-                            <p:childTnLst>
-                              <p:par>
-                                <p:cTn id="10" presetID="22" presetClass="entr" presetSubtype="8" fill="hold" nodeType="clickEffect">
-                                  <p:stCondLst>
-                                    <p:cond delay="0"/>
-                                  </p:stCondLst>
-                                  <p:childTnLst>
-                                    <p:set>
-                                      <p:cBhvr>
-                                        <p:cTn id="11" dur="1" fill="hold">
                                           <p:stCondLst>
                                             <p:cond delay="0"/>
                                           </p:stCondLst>
@@ -4630,7 +4730,7 @@
                                     </p:set>
                                     <p:animEffect transition="in" filter="wipe(left)">
                                       <p:cBhvr>
-                                        <p:cTn id="12" dur="1000"/>
+                                        <p:cTn id="7" dur="2000"/>
                                         <p:tgtEl>
                                           <p:spTgt spid="5"/>
                                         </p:tgtEl>
@@ -4825,7 +4925,7 @@
           <a:graphicData uri="http://schemas.openxmlformats.org/presentationml/2006/ole">
             <mc:AlternateContent xmlns:mc="http://schemas.openxmlformats.org/markup-compatibility/2006">
               <mc:Choice xmlns:v="urn:schemas-microsoft-com:vml" Requires="v">
-                <p:oleObj spid="_x0000_s204829" name="Equation" r:id="rId4" imgW="2070100" imgH="584200" progId="Equation.DSMT4">
+                <p:oleObj spid="_x0000_s204832" name="Equation" r:id="rId4" imgW="2070100" imgH="584200" progId="Equation.DSMT4">
                   <p:embed/>
                 </p:oleObj>
               </mc:Choice>
@@ -4876,7 +4976,83 @@
   <p:timing>
     <p:tnLst>
       <p:par>
-        <p:cTn xmlns:p14="http://schemas.microsoft.com/office/powerpoint/2010/main" id="1" dur="indefinite" restart="never" nodeType="tmRoot"/>
+        <p:cTn xmlns:p14="http://schemas.microsoft.com/office/powerpoint/2010/main" id="1" dur="indefinite" restart="never" nodeType="tmRoot">
+          <p:childTnLst>
+            <p:seq concurrent="1" nextAc="seek">
+              <p:cTn id="2" dur="indefinite" nodeType="mainSeq">
+                <p:childTnLst>
+                  <p:par>
+                    <p:cTn id="3" fill="hold">
+                      <p:stCondLst>
+                        <p:cond delay="indefinite"/>
+                      </p:stCondLst>
+                      <p:childTnLst>
+                        <p:par>
+                          <p:cTn id="4" fill="hold">
+                            <p:stCondLst>
+                              <p:cond delay="0"/>
+                            </p:stCondLst>
+                            <p:childTnLst>
+                              <p:par>
+                                <p:cTn id="5" presetID="10" presetClass="entr" presetSubtype="0" fill="hold" nodeType="clickEffect">
+                                  <p:stCondLst>
+                                    <p:cond delay="0"/>
+                                  </p:stCondLst>
+                                  <p:childTnLst>
+                                    <p:set>
+                                      <p:cBhvr>
+                                        <p:cTn id="6" dur="1" fill="hold">
+                                          <p:stCondLst>
+                                            <p:cond delay="0"/>
+                                          </p:stCondLst>
+                                        </p:cTn>
+                                        <p:tgtEl>
+                                          <p:spTgt spid="4"/>
+                                        </p:tgtEl>
+                                        <p:attrNameLst>
+                                          <p:attrName>style.visibility</p:attrName>
+                                        </p:attrNameLst>
+                                      </p:cBhvr>
+                                      <p:to>
+                                        <p:strVal val="visible"/>
+                                      </p:to>
+                                    </p:set>
+                                    <p:animEffect transition="in" filter="fade">
+                                      <p:cBhvr>
+                                        <p:cTn id="7" dur="1000"/>
+                                        <p:tgtEl>
+                                          <p:spTgt spid="4"/>
+                                        </p:tgtEl>
+                                      </p:cBhvr>
+                                    </p:animEffect>
+                                  </p:childTnLst>
+                                </p:cTn>
+                              </p:par>
+                            </p:childTnLst>
+                          </p:cTn>
+                        </p:par>
+                      </p:childTnLst>
+                    </p:cTn>
+                  </p:par>
+                </p:childTnLst>
+              </p:cTn>
+              <p:prevCondLst>
+                <p:cond evt="onPrev" delay="0">
+                  <p:tgtEl>
+                    <p:sldTgt/>
+                  </p:tgtEl>
+                </p:cond>
+              </p:prevCondLst>
+              <p:nextCondLst>
+                <p:cond evt="onNext" delay="0">
+                  <p:tgtEl>
+                    <p:sldTgt/>
+                  </p:tgtEl>
+                </p:cond>
+              </p:nextCondLst>
+            </p:seq>
+          </p:childTnLst>
+        </p:cTn>
       </p:par>
     </p:tnLst>
   </p:timing>
@@ -5038,7 +5214,7 @@
           <a:graphicData uri="http://schemas.openxmlformats.org/presentationml/2006/ole">
             <mc:AlternateContent xmlns:mc="http://schemas.openxmlformats.org/markup-compatibility/2006">
               <mc:Choice xmlns:v="urn:schemas-microsoft-com:vml" Requires="v">
-                <p:oleObj spid="_x0000_s206871" name="Equation" r:id="rId4" imgW="2336800" imgH="533400" progId="Equation.DSMT4">
+                <p:oleObj spid="_x0000_s206874" name="Equation" r:id="rId4" imgW="2336800" imgH="533400" progId="Equation.DSMT4">
                   <p:embed/>
                 </p:oleObj>
               </mc:Choice>
@@ -5223,13 +5399,19 @@
                 </a:solidFill>
                 <a:latin typeface="Comic Sans MS" pitchFamily="66" charset="0"/>
               </a:rPr>
-              <a:t>n</a:t>
+              <a:t>k</a:t>
             </a:r>
             <a:r>
               <a:rPr lang="en-US" sz="6000" dirty="0" smtClean="0">
                 <a:latin typeface="Comic Sans MS" pitchFamily="66" charset="0"/>
               </a:rPr>
-              <a:t> of the </a:t>
+              <a:t> </a:t>
+            </a:r>
+            <a:r>
+              <a:rPr lang="en-US" sz="6000" dirty="0" smtClean="0">
+                <a:latin typeface="Comic Sans MS" pitchFamily="66" charset="0"/>
+              </a:rPr>
+              <a:t>of the </a:t>
             </a:r>
             <a:r>
               <a:rPr lang="en-US" sz="6000" dirty="0" err="1" smtClean="0">
@@ -5247,7 +5429,7 @@
                 </a:solidFill>
                 <a:latin typeface="Comic Sans MS" pitchFamily="66" charset="0"/>
               </a:rPr>
-              <a:t>k</a:t>
+              <a:t>j</a:t>
             </a:r>
             <a:r>
               <a:rPr lang="en-US" sz="5400" dirty="0" err="1" smtClean="0">
@@ -5271,7 +5453,19 @@
                 </a:solidFill>
                 <a:latin typeface="Comic Sans MS" pitchFamily="66" charset="0"/>
               </a:rPr>
-              <a:t> include </a:t>
+              <a:t> </a:t>
+            </a:r>
+            <a:r>
+              <a:rPr lang="en-US" sz="5400" dirty="0" smtClean="0">
+                <a:solidFill>
+                  <a:schemeClr val="tx1">
+                    <a:lumMod val="95000"/>
+                    <a:lumOff val="5000"/>
+                  </a:schemeClr>
+                </a:solidFill>
+                <a:latin typeface="Comic Sans MS" pitchFamily="66" charset="0"/>
+              </a:rPr>
+              <a:t>include </a:t>
             </a:r>
             <a:r>
               <a:rPr lang="en-US" sz="6000" dirty="0" smtClean="0">
@@ -5336,7 +5530,7 @@
           <a:graphicData uri="http://schemas.openxmlformats.org/presentationml/2006/ole">
             <mc:AlternateContent xmlns:mc="http://schemas.openxmlformats.org/markup-compatibility/2006">
               <mc:Choice xmlns:v="urn:schemas-microsoft-com:vml" Requires="v">
-                <p:oleObj spid="_x0000_s205896" name="Equation" r:id="rId4" imgW="139700" imgH="215900" progId="Equation.DSMT4">
+                <p:oleObj spid="_x0000_s205903" name="Equation" r:id="rId4" imgW="139700" imgH="215900" progId="Equation.DSMT4">
                   <p:embed/>
                 </p:oleObj>
               </mc:Choice>
@@ -5393,7 +5587,7 @@
           <a:graphicData uri="http://schemas.openxmlformats.org/presentationml/2006/ole">
             <mc:AlternateContent xmlns:mc="http://schemas.openxmlformats.org/markup-compatibility/2006">
               <mc:Choice xmlns:v="urn:schemas-microsoft-com:vml" Requires="v">
-                <p:oleObj spid="_x0000_s205897" name="Equation" r:id="rId6" imgW="139700" imgH="215900" progId="Equation.DSMT4">
+                <p:oleObj spid="_x0000_s205904" name="Equation" r:id="rId6" imgW="139700" imgH="215900" progId="Equation.DSMT4">
                   <p:embed/>
                 </p:oleObj>
               </mc:Choice>
@@ -5437,7 +5631,7 @@
           <p:nvPr>
             <p:extLst>
               <p:ext uri="{D42A27DB-BD31-4B8C-83A1-F6EECF244321}">
-                <p14:modId xmlns:p14="http://schemas.microsoft.com/office/powerpoint/2010/main" val="299199929"/>
+                <p14:modId xmlns:p14="http://schemas.microsoft.com/office/powerpoint/2010/main" val="4067625673"/>
               </p:ext>
             </p:extLst>
           </p:nvPr>
@@ -5450,7 +5644,7 @@
           <a:graphicData uri="http://schemas.openxmlformats.org/presentationml/2006/ole">
             <mc:AlternateContent xmlns:mc="http://schemas.openxmlformats.org/markup-compatibility/2006">
               <mc:Choice xmlns:v="urn:schemas-microsoft-com:vml" Requires="v">
-                <p:oleObj spid="_x0000_s205898" name="Equation" r:id="rId7" imgW="1574800" imgH="533400" progId="Equation.DSMT4">
+                <p:oleObj spid="_x0000_s205905" name="Equation" r:id="rId7" imgW="1574800" imgH="533400" progId="Equation.DSMT4">
                   <p:embed/>
                 </p:oleObj>
               </mc:Choice>
@@ -5501,7 +5695,83 @@
   <p:timing>
     <p:tnLst>
       <p:par>
-        <p:cTn xmlns:p14="http://schemas.microsoft.com/office/powerpoint/2010/main" id="1" dur="indefinite" restart="never" nodeType="tmRoot"/>
+        <p:cTn xmlns:p14="http://schemas.microsoft.com/office/powerpoint/2010/main" id="1" dur="indefinite" restart="never" nodeType="tmRoot">
+          <p:childTnLst>
+            <p:seq concurrent="1" nextAc="seek">
+              <p:cTn id="2" dur="indefinite" nodeType="mainSeq">
+                <p:childTnLst>
+                  <p:par>
+                    <p:cTn id="3" fill="hold">
+                      <p:stCondLst>
+                        <p:cond delay="indefinite"/>
+                      </p:stCondLst>
+                      <p:childTnLst>
+                        <p:par>
+                          <p:cTn id="4" fill="hold">
+                            <p:stCondLst>
+                              <p:cond delay="0"/>
+                            </p:stCondLst>
+                            <p:childTnLst>
+                              <p:par>
+                                <p:cTn id="5" presetID="10" presetClass="entr" presetSubtype="0" fill="hold" nodeType="clickEffect">
+                                  <p:stCondLst>
+                                    <p:cond delay="0"/>
+                                  </p:stCondLst>
+                                  <p:childTnLst>
+                                    <p:set>
+                                      <p:cBhvr>
+                                        <p:cTn id="6" dur="1" fill="hold">
+                                          <p:stCondLst>
+                                            <p:cond delay="0"/>
+                                          </p:stCondLst>
+                                        </p:cTn>
+                                        <p:tgtEl>
+                                          <p:spTgt spid="6"/>
+                                        </p:tgtEl>
+                                        <p:attrNameLst>
+                                          <p:attrName>style.visibility</p:attrName>
+                                        </p:attrNameLst>
+                                      </p:cBhvr>
+                                      <p:to>
+                                        <p:strVal val="visible"/>
+                                      </p:to>
+                                    </p:set>
+                                    <p:animEffect transition="in" filter="fade">
+                                      <p:cBhvr>
+                                        <p:cTn id="7" dur="500"/>
+                                        <p:tgtEl>
+                                          <p:spTgt spid="6"/>
+                                        </p:tgtEl>
+                                      </p:cBhvr>
+                                    </p:animEffect>
+                                  </p:childTnLst>
+                                </p:cTn>
+                              </p:par>
+                            </p:childTnLst>
+                          </p:cTn>
+                        </p:par>
+                      </p:childTnLst>
+                    </p:cTn>
+                  </p:par>
+                </p:childTnLst>
+              </p:cTn>
+              <p:prevCondLst>
+                <p:cond evt="onPrev" delay="0">
+                  <p:tgtEl>
+                    <p:sldTgt/>
+                  </p:tgtEl>
+                </p:cond>
+              </p:prevCondLst>
+              <p:nextCondLst>
+                <p:cond evt="onNext" delay="0">
+                  <p:tgtEl>
+                    <p:sldTgt/>
+                  </p:tgtEl>
+                </p:cond>
+              </p:nextCondLst>
+            </p:seq>
+          </p:childTnLst>
+        </p:cTn>
       </p:par>
     </p:tnLst>
   </p:timing>
@@ -5635,13 +5905,19 @@
                 </a:solidFill>
                 <a:latin typeface="Comic Sans MS" pitchFamily="66" charset="0"/>
               </a:rPr>
-              <a:t>n</a:t>
+              <a:t>k</a:t>
             </a:r>
             <a:r>
               <a:rPr lang="en-US" sz="6000" dirty="0" smtClean="0">
                 <a:latin typeface="Comic Sans MS" pitchFamily="66" charset="0"/>
               </a:rPr>
-              <a:t> of the </a:t>
+              <a:t> </a:t>
+            </a:r>
+            <a:r>
+              <a:rPr lang="en-US" sz="6000" dirty="0" smtClean="0">
+                <a:latin typeface="Comic Sans MS" pitchFamily="66" charset="0"/>
+              </a:rPr>
+              <a:t>of the </a:t>
             </a:r>
             <a:r>
               <a:rPr lang="en-US" sz="6000" dirty="0" err="1" smtClean="0">
@@ -5659,7 +5935,7 @@
                 </a:solidFill>
                 <a:latin typeface="Comic Sans MS" pitchFamily="66" charset="0"/>
               </a:rPr>
-              <a:t>k</a:t>
+              <a:t>j</a:t>
             </a:r>
             <a:r>
               <a:rPr lang="en-US" sz="5400" dirty="0" err="1" smtClean="0">
@@ -5683,7 +5959,19 @@
                 </a:solidFill>
                 <a:latin typeface="Comic Sans MS" pitchFamily="66" charset="0"/>
               </a:rPr>
-              <a:t> include </a:t>
+              <a:t> </a:t>
+            </a:r>
+            <a:r>
+              <a:rPr lang="en-US" sz="5400" dirty="0" smtClean="0">
+                <a:solidFill>
+                  <a:schemeClr val="tx1">
+                    <a:lumMod val="95000"/>
+                    <a:lumOff val="5000"/>
+                  </a:schemeClr>
+                </a:solidFill>
+                <a:latin typeface="Comic Sans MS" pitchFamily="66" charset="0"/>
+              </a:rPr>
+              <a:t>include </a:t>
             </a:r>
             <a:r>
               <a:rPr lang="en-US" sz="6000" dirty="0" smtClean="0">
@@ -5748,7 +6036,7 @@
           <a:graphicData uri="http://schemas.openxmlformats.org/presentationml/2006/ole">
             <mc:AlternateContent xmlns:mc="http://schemas.openxmlformats.org/markup-compatibility/2006">
               <mc:Choice xmlns:v="urn:schemas-microsoft-com:vml" Requires="v">
-                <p:oleObj spid="_x0000_s207953" name="Equation" r:id="rId4" imgW="139700" imgH="215900" progId="Equation.DSMT4">
+                <p:oleObj spid="_x0000_s207962" name="Equation" r:id="rId4" imgW="139700" imgH="215900" progId="Equation.DSMT4">
                   <p:embed/>
                 </p:oleObj>
               </mc:Choice>
@@ -5805,7 +6093,7 @@
           <a:graphicData uri="http://schemas.openxmlformats.org/presentationml/2006/ole">
             <mc:AlternateContent xmlns:mc="http://schemas.openxmlformats.org/markup-compatibility/2006">
               <mc:Choice xmlns:v="urn:schemas-microsoft-com:vml" Requires="v">
-                <p:oleObj spid="_x0000_s207954" name="Equation" r:id="rId6" imgW="139700" imgH="215900" progId="Equation.DSMT4">
+                <p:oleObj spid="_x0000_s207963" name="Equation" r:id="rId6" imgW="139700" imgH="215900" progId="Equation.DSMT4">
                   <p:embed/>
                 </p:oleObj>
               </mc:Choice>
@@ -5862,7 +6150,7 @@
           <a:graphicData uri="http://schemas.openxmlformats.org/presentationml/2006/ole">
             <mc:AlternateContent xmlns:mc="http://schemas.openxmlformats.org/markup-compatibility/2006">
               <mc:Choice xmlns:v="urn:schemas-microsoft-com:vml" Requires="v">
-                <p:oleObj spid="_x0000_s207955" name="Equation" r:id="rId7" imgW="1765300" imgH="533400" progId="Equation.DSMT4">
+                <p:oleObj spid="_x0000_s207964" name="Equation" r:id="rId7" imgW="1765300" imgH="533400" progId="Equation.DSMT4">
                   <p:embed/>
                 </p:oleObj>
               </mc:Choice>
@@ -5906,25 +6194,25 @@
           <p:nvPr>
             <p:extLst>
               <p:ext uri="{D42A27DB-BD31-4B8C-83A1-F6EECF244321}">
-                <p14:modId xmlns:p14="http://schemas.microsoft.com/office/powerpoint/2010/main" val="4020792745"/>
+                <p14:modId xmlns:p14="http://schemas.microsoft.com/office/powerpoint/2010/main" val="92950744"/>
               </p:ext>
             </p:extLst>
           </p:nvPr>
         </p:nvGraphicFramePr>
         <p:xfrm>
-          <a:off x="1587492" y="3962400"/>
-          <a:ext cx="6184908" cy="2362200"/>
+          <a:off x="1558925" y="3962400"/>
+          <a:ext cx="6242050" cy="2362200"/>
         </p:xfrm>
         <a:graphic>
           <a:graphicData uri="http://schemas.openxmlformats.org/presentationml/2006/ole">
             <mc:AlternateContent xmlns:mc="http://schemas.openxmlformats.org/markup-compatibility/2006">
               <mc:Choice xmlns:v="urn:schemas-microsoft-com:vml" Requires="v">
-                <p:oleObj spid="_x0000_s207956" name="Equation" r:id="rId9" imgW="1397000" imgH="533400" progId="Equation.DSMT4">
+                <p:oleObj spid="_x0000_s207965" name="Equation" r:id="rId9" imgW="1409700" imgH="533400" progId="Equation.DSMT4">
                   <p:embed/>
                 </p:oleObj>
               </mc:Choice>
               <mc:Fallback>
-                <p:oleObj name="Equation" r:id="rId9" imgW="1397000" imgH="533400" progId="Equation.DSMT4">
+                <p:oleObj name="Equation" r:id="rId9" imgW="1409700" imgH="533400" progId="Equation.DSMT4">
                   <p:embed/>
                   <p:pic>
                     <p:nvPicPr>
@@ -5940,8 +6228,8 @@
                     </p:blipFill>
                     <p:spPr>
                       <a:xfrm>
-                        <a:off x="1587492" y="3962400"/>
-                        <a:ext cx="6184908" cy="2362200"/>
+                        <a:off x="1558925" y="3962400"/>
+                        <a:ext cx="6242050" cy="2362200"/>
                       </a:xfrm>
                       <a:prstGeom prst="rect">
                         <a:avLst/>
@@ -6126,7 +6414,7 @@
           <a:graphicData uri="http://schemas.openxmlformats.org/presentationml/2006/ole">
             <mc:AlternateContent xmlns:mc="http://schemas.openxmlformats.org/markup-compatibility/2006">
               <mc:Choice xmlns:v="urn:schemas-microsoft-com:vml" Requires="v">
-                <p:oleObj spid="_x0000_s209971" name="Equation" r:id="rId4" imgW="2057400" imgH="533400" progId="Equation.DSMT4">
+                <p:oleObj spid="_x0000_s209978" name="Equation" r:id="rId4" imgW="2057400" imgH="533400" progId="Equation.DSMT4">
                   <p:embed/>
                 </p:oleObj>
               </mc:Choice>
@@ -6183,7 +6471,7 @@
           <a:graphicData uri="http://schemas.openxmlformats.org/presentationml/2006/ole">
             <mc:AlternateContent xmlns:mc="http://schemas.openxmlformats.org/markup-compatibility/2006">
               <mc:Choice xmlns:v="urn:schemas-microsoft-com:vml" Requires="v">
-                <p:oleObj spid="_x0000_s209972" name="Equation" r:id="rId6" imgW="1397000" imgH="241300" progId="Equation.DSMT4">
+                <p:oleObj spid="_x0000_s209979" name="Equation" r:id="rId6" imgW="1397000" imgH="241300" progId="Equation.DSMT4">
                   <p:embed/>
                 </p:oleObj>
               </mc:Choice>
@@ -6299,7 +6587,7 @@
           <a:graphicData uri="http://schemas.openxmlformats.org/presentationml/2006/ole">
             <mc:AlternateContent xmlns:mc="http://schemas.openxmlformats.org/markup-compatibility/2006">
               <mc:Choice xmlns:v="urn:schemas-microsoft-com:vml" Requires="v">
-                <p:oleObj spid="_x0000_s209973" name="Equation" r:id="rId8" imgW="1549400" imgH="266700" progId="Equation.DSMT4">
+                <p:oleObj spid="_x0000_s209980" name="Equation" r:id="rId8" imgW="1549400" imgH="266700" progId="Equation.DSMT4">
                   <p:embed/>
                 </p:oleObj>
               </mc:Choice>

</xml_diff>